<commit_message>
pequenas mudanças de conclusões
</commit_message>
<xml_diff>
--- a/Bank Marketing.pptx
+++ b/Bank Marketing.pptx
@@ -317,7 +317,7 @@
             <a:fld id="{8E36636D-D922-432D-A958-524484B5923D}" type="datetimeFigureOut">
               <a:rPr lang="en-US" dirty="0"/>
               <a:pPr/>
-              <a:t>2/20/2018</a:t>
+              <a:t>2/26/2018</a:t>
             </a:fld>
             <a:endParaRPr lang="en-US" dirty="0"/>
           </a:p>
@@ -611,7 +611,7 @@
           <a:p>
             <a:fld id="{48A87A34-81AB-432B-8DAE-1953F412C126}" type="datetimeFigureOut">
               <a:rPr lang="en-US" dirty="0"/>
-              <a:t>2/20/2018</a:t>
+              <a:t>2/26/2018</a:t>
             </a:fld>
             <a:endParaRPr lang="en-US" dirty="0"/>
           </a:p>
@@ -798,7 +798,7 @@
           <a:p>
             <a:fld id="{48A87A34-81AB-432B-8DAE-1953F412C126}" type="datetimeFigureOut">
               <a:rPr lang="en-US" dirty="0"/>
-              <a:t>2/20/2018</a:t>
+              <a:t>2/26/2018</a:t>
             </a:fld>
             <a:endParaRPr lang="en-US" dirty="0"/>
           </a:p>
@@ -1054,7 +1054,7 @@
           <a:p>
             <a:fld id="{48A87A34-81AB-432B-8DAE-1953F412C126}" type="datetimeFigureOut">
               <a:rPr lang="en-US" dirty="0"/>
-              <a:t>2/20/2018</a:t>
+              <a:t>2/26/2018</a:t>
             </a:fld>
             <a:endParaRPr lang="en-US" dirty="0"/>
           </a:p>
@@ -1473,7 +1473,7 @@
           <a:p>
             <a:fld id="{48A87A34-81AB-432B-8DAE-1953F412C126}" type="datetimeFigureOut">
               <a:rPr lang="en-US" dirty="0"/>
-              <a:t>2/20/2018</a:t>
+              <a:t>2/26/2018</a:t>
             </a:fld>
             <a:endParaRPr lang="en-US" dirty="0"/>
           </a:p>
@@ -2005,7 +2005,7 @@
           <a:p>
             <a:fld id="{48A87A34-81AB-432B-8DAE-1953F412C126}" type="datetimeFigureOut">
               <a:rPr lang="en-US" dirty="0"/>
-              <a:t>2/20/2018</a:t>
+              <a:t>2/26/2018</a:t>
             </a:fld>
             <a:endParaRPr lang="en-US" dirty="0"/>
           </a:p>
@@ -2864,7 +2864,7 @@
           <a:p>
             <a:fld id="{48A87A34-81AB-432B-8DAE-1953F412C126}" type="datetimeFigureOut">
               <a:rPr lang="en-US" dirty="0"/>
-              <a:t>2/20/2018</a:t>
+              <a:t>2/26/2018</a:t>
             </a:fld>
             <a:endParaRPr lang="en-US" dirty="0"/>
           </a:p>
@@ -3030,7 +3030,7 @@
             <a:fld id="{8E36636D-D922-432D-A958-524484B5923D}" type="datetimeFigureOut">
               <a:rPr lang="en-US" dirty="0"/>
               <a:pPr/>
-              <a:t>2/20/2018</a:t>
+              <a:t>2/26/2018</a:t>
             </a:fld>
             <a:endParaRPr lang="en-US" dirty="0"/>
           </a:p>
@@ -3211,7 +3211,7 @@
             <a:fld id="{8E36636D-D922-432D-A958-524484B5923D}" type="datetimeFigureOut">
               <a:rPr lang="en-US" dirty="0"/>
               <a:pPr/>
-              <a:t>2/20/2018</a:t>
+              <a:t>2/26/2018</a:t>
             </a:fld>
             <a:endParaRPr lang="en-US" dirty="0"/>
           </a:p>
@@ -3378,7 +3378,7 @@
             <a:fld id="{8E36636D-D922-432D-A958-524484B5923D}" type="datetimeFigureOut">
               <a:rPr lang="en-US" dirty="0"/>
               <a:pPr/>
-              <a:t>2/20/2018</a:t>
+              <a:t>2/26/2018</a:t>
             </a:fld>
             <a:endParaRPr lang="en-US" dirty="0"/>
           </a:p>
@@ -3619,7 +3619,7 @@
             <a:fld id="{8E36636D-D922-432D-A958-524484B5923D}" type="datetimeFigureOut">
               <a:rPr lang="en-US" dirty="0"/>
               <a:pPr/>
-              <a:t>2/20/2018</a:t>
+              <a:t>2/26/2018</a:t>
             </a:fld>
             <a:endParaRPr lang="en-US" dirty="0"/>
           </a:p>
@@ -3852,7 +3852,7 @@
             <a:fld id="{8E36636D-D922-432D-A958-524484B5923D}" type="datetimeFigureOut">
               <a:rPr lang="en-US" dirty="0"/>
               <a:pPr/>
-              <a:t>2/20/2018</a:t>
+              <a:t>2/26/2018</a:t>
             </a:fld>
             <a:endParaRPr lang="en-US" dirty="0"/>
           </a:p>
@@ -4315,7 +4315,7 @@
             <a:fld id="{8E36636D-D922-432D-A958-524484B5923D}" type="datetimeFigureOut">
               <a:rPr lang="en-US" dirty="0"/>
               <a:pPr/>
-              <a:t>2/20/2018</a:t>
+              <a:t>2/26/2018</a:t>
             </a:fld>
             <a:endParaRPr lang="en-US" dirty="0"/>
           </a:p>
@@ -4430,7 +4430,7 @@
             <a:fld id="{8E36636D-D922-432D-A958-524484B5923D}" type="datetimeFigureOut">
               <a:rPr lang="en-US" dirty="0"/>
               <a:pPr/>
-              <a:t>2/20/2018</a:t>
+              <a:t>2/26/2018</a:t>
             </a:fld>
             <a:endParaRPr lang="en-US" dirty="0"/>
           </a:p>
@@ -4522,7 +4522,7 @@
             <a:fld id="{8E36636D-D922-432D-A958-524484B5923D}" type="datetimeFigureOut">
               <a:rPr lang="en-US" dirty="0"/>
               <a:pPr/>
-              <a:t>2/20/2018</a:t>
+              <a:t>2/26/2018</a:t>
             </a:fld>
             <a:endParaRPr lang="en-US" dirty="0"/>
           </a:p>
@@ -4774,7 +4774,7 @@
             <a:fld id="{8E36636D-D922-432D-A958-524484B5923D}" type="datetimeFigureOut">
               <a:rPr lang="en-US" dirty="0"/>
               <a:pPr/>
-              <a:t>2/20/2018</a:t>
+              <a:t>2/26/2018</a:t>
             </a:fld>
             <a:endParaRPr lang="en-US" dirty="0"/>
           </a:p>
@@ -5071,7 +5071,7 @@
             <a:fld id="{8E36636D-D922-432D-A958-524484B5923D}" type="datetimeFigureOut">
               <a:rPr lang="en-US" dirty="0"/>
               <a:pPr/>
-              <a:t>2/20/2018</a:t>
+              <a:t>2/26/2018</a:t>
             </a:fld>
             <a:endParaRPr lang="en-US" dirty="0"/>
           </a:p>
@@ -5302,7 +5302,7 @@
             <a:fld id="{8E36636D-D922-432D-A958-524484B5923D}" type="datetimeFigureOut">
               <a:rPr lang="en-US" dirty="0"/>
               <a:pPr/>
-              <a:t>2/20/2018</a:t>
+              <a:t>2/26/2018</a:t>
             </a:fld>
             <a:endParaRPr lang="en-US" dirty="0"/>
           </a:p>
@@ -6556,7 +6556,7 @@
                   <a:srgbClr val="FFFF00"/>
                 </a:solidFill>
               </a:rPr>
-              <a:t>campaign</a:t>
+              <a:t>cont_antes</a:t>
             </a:r>
             <a:endParaRPr lang="pt-BR" dirty="0">
               <a:solidFill>
@@ -7416,7 +7416,7 @@
                   <a:srgbClr val="FFFFFF"/>
                 </a:solidFill>
               </a:rPr>
-              <a:t> foi reduzido para 2283 instâncias, com um onde a variável Y ficou com YES = 521 , NO = 1762 sendo que as linhas do novo </a:t>
+              <a:t> foi reduzido para 2283 instâncias,  onde a variável Y ficou com YES = 521 , NO = 1762 sendo que as linhas do novo </a:t>
             </a:r>
             <a:r>
               <a:rPr lang="pt-BR" sz="2200" dirty="0" err="1">
@@ -8058,7 +8058,7 @@
         <p:spPr/>
         <p:txBody>
           <a:bodyPr>
-            <a:normAutofit lnSpcReduction="10000"/>
+            <a:normAutofit fontScale="92500"/>
           </a:bodyPr>
           <a:lstStyle/>
           <a:p>
@@ -8121,6 +8121,32 @@
                 <a:srgbClr val="FFFF00"/>
               </a:solidFill>
             </a:endParaRPr>
+          </a:p>
+          <a:p>
+            <a:r>
+              <a:rPr lang="pt-BR" sz="2400" dirty="0"/>
+              <a:t>Foi criado a coluna CONT_ANTES como tratamento da coluna </a:t>
+            </a:r>
+            <a:r>
+              <a:rPr lang="pt-BR" sz="2400" dirty="0" err="1">
+                <a:solidFill>
+                  <a:srgbClr val="FFFF00"/>
+                </a:solidFill>
+              </a:rPr>
+              <a:t>pdays</a:t>
+            </a:r>
+            <a:r>
+              <a:rPr lang="pt-BR" sz="2400" dirty="0"/>
+              <a:t>, se já foi </a:t>
+            </a:r>
+            <a:r>
+              <a:rPr lang="pt-BR" sz="2400" dirty="0" err="1"/>
+              <a:t>contactado</a:t>
+            </a:r>
+            <a:r>
+              <a:rPr lang="pt-BR" sz="2400" dirty="0"/>
+              <a:t> antes ou não</a:t>
+            </a:r>
           </a:p>
         </p:txBody>
       </p:sp>
@@ -8205,19 +8231,21 @@
         </p:nvSpPr>
         <p:spPr/>
         <p:txBody>
-          <a:bodyPr/>
-          <a:lstStyle/>
-          <a:p>
-            <a:r>
-              <a:rPr lang="pt-BR" sz="2400" dirty="0"/>
+          <a:bodyPr>
+            <a:normAutofit fontScale="92500" lnSpcReduction="10000"/>
+          </a:bodyPr>
+          <a:lstStyle/>
+          <a:p>
+            <a:r>
+              <a:rPr lang="pt-BR" sz="2800" dirty="0"/>
               <a:t>removido as colunas </a:t>
             </a:r>
             <a:r>
-              <a:rPr lang="pt-BR" sz="2400" dirty="0" err="1"/>
+              <a:rPr lang="pt-BR" sz="2800" dirty="0" err="1"/>
               <a:t>j</a:t>
             </a:r>
             <a:r>
-              <a:rPr lang="pt-BR" sz="2400" dirty="0" err="1">
+              <a:rPr lang="pt-BR" sz="2800" dirty="0" err="1">
                 <a:solidFill>
                   <a:srgbClr val="FFFF00"/>
                 </a:solidFill>
@@ -8225,11 +8253,11 @@
               <a:t>ob</a:t>
             </a:r>
             <a:r>
-              <a:rPr lang="pt-BR" sz="2400" dirty="0"/>
+              <a:rPr lang="pt-BR" sz="2800" dirty="0"/>
               <a:t>,</a:t>
             </a:r>
             <a:r>
-              <a:rPr lang="pt-BR" sz="2400" dirty="0">
+              <a:rPr lang="pt-BR" sz="2800" dirty="0">
                 <a:solidFill>
                   <a:srgbClr val="FFFF00"/>
                 </a:solidFill>
@@ -8237,7 +8265,7 @@
               <a:t> </a:t>
             </a:r>
             <a:r>
-              <a:rPr lang="pt-BR" sz="2400" dirty="0" err="1">
+              <a:rPr lang="pt-BR" sz="2800" dirty="0" err="1">
                 <a:solidFill>
                   <a:srgbClr val="FFFF00"/>
                 </a:solidFill>
@@ -8245,11 +8273,11 @@
               <a:t>age</a:t>
             </a:r>
             <a:r>
-              <a:rPr lang="pt-BR" sz="2400" dirty="0" err="1"/>
+              <a:rPr lang="pt-BR" sz="2800" dirty="0" err="1"/>
               <a:t>,</a:t>
             </a:r>
             <a:r>
-              <a:rPr lang="pt-BR" sz="2400" dirty="0" err="1">
+              <a:rPr lang="pt-BR" sz="2800" dirty="0" err="1">
                 <a:solidFill>
                   <a:srgbClr val="FFFF00"/>
                 </a:solidFill>
@@ -8257,11 +8285,11 @@
               <a:t>housing</a:t>
             </a:r>
             <a:r>
-              <a:rPr lang="pt-BR" sz="2400" dirty="0" err="1"/>
+              <a:rPr lang="pt-BR" sz="2800" dirty="0" err="1"/>
               <a:t>,</a:t>
             </a:r>
             <a:r>
-              <a:rPr lang="pt-BR" sz="2400" dirty="0" err="1">
+              <a:rPr lang="pt-BR" sz="2800" dirty="0" err="1">
                 <a:solidFill>
                   <a:srgbClr val="FFFF00"/>
                 </a:solidFill>
@@ -8269,11 +8297,11 @@
               <a:t>loan</a:t>
             </a:r>
             <a:r>
-              <a:rPr lang="pt-BR" sz="2400" dirty="0"/>
+              <a:rPr lang="pt-BR" sz="2800" dirty="0"/>
               <a:t>, </a:t>
             </a:r>
             <a:r>
-              <a:rPr lang="pt-BR" sz="2400" dirty="0" err="1">
+              <a:rPr lang="pt-BR" sz="2800" dirty="0" err="1">
                 <a:solidFill>
                   <a:srgbClr val="FFFF00"/>
                 </a:solidFill>
@@ -8281,11 +8309,11 @@
               <a:t>marital</a:t>
             </a:r>
             <a:r>
-              <a:rPr lang="pt-BR" sz="2400" dirty="0" err="1"/>
+              <a:rPr lang="pt-BR" sz="2800" dirty="0" err="1"/>
               <a:t>,</a:t>
             </a:r>
             <a:r>
-              <a:rPr lang="pt-BR" sz="2400" dirty="0" err="1">
+              <a:rPr lang="pt-BR" sz="2800" dirty="0" err="1">
                 <a:solidFill>
                   <a:srgbClr val="FFFF00"/>
                 </a:solidFill>
@@ -8293,11 +8321,11 @@
               <a:t>poutcome</a:t>
             </a:r>
             <a:r>
-              <a:rPr lang="pt-BR" sz="2400" dirty="0" err="1"/>
+              <a:rPr lang="pt-BR" sz="2800" dirty="0" err="1"/>
               <a:t>,</a:t>
             </a:r>
             <a:r>
-              <a:rPr lang="pt-BR" sz="2400" dirty="0" err="1">
+              <a:rPr lang="pt-BR" sz="2800" dirty="0" err="1">
                 <a:solidFill>
                   <a:srgbClr val="FFFF00"/>
                 </a:solidFill>
@@ -8305,11 +8333,11 @@
               <a:t>previous</a:t>
             </a:r>
             <a:r>
-              <a:rPr lang="pt-BR" sz="2400" dirty="0"/>
+              <a:rPr lang="pt-BR" sz="2800" dirty="0"/>
               <a:t>, </a:t>
             </a:r>
             <a:r>
-              <a:rPr lang="pt-BR" sz="2400" dirty="0">
+              <a:rPr lang="pt-BR" sz="2800" dirty="0">
                 <a:solidFill>
                   <a:srgbClr val="FFFF00"/>
                 </a:solidFill>
@@ -8317,11 +8345,11 @@
               <a:t>default</a:t>
             </a:r>
             <a:r>
-              <a:rPr lang="pt-BR" sz="2400" dirty="0"/>
+              <a:rPr lang="pt-BR" sz="2800" dirty="0"/>
               <a:t>, </a:t>
             </a:r>
             <a:r>
-              <a:rPr lang="pt-BR" sz="2400" dirty="0" err="1">
+              <a:rPr lang="pt-BR" sz="2800" dirty="0" err="1">
                 <a:solidFill>
                   <a:srgbClr val="FFFF00"/>
                 </a:solidFill>
@@ -8329,11 +8357,11 @@
               <a:t>contact</a:t>
             </a:r>
             <a:r>
-              <a:rPr lang="pt-BR" sz="2400" dirty="0" err="1"/>
+              <a:rPr lang="pt-BR" sz="2800" dirty="0" err="1"/>
               <a:t>,</a:t>
             </a:r>
             <a:r>
-              <a:rPr lang="pt-BR" sz="2400" dirty="0" err="1">
+              <a:rPr lang="pt-BR" sz="2800" dirty="0" err="1">
                 <a:solidFill>
                   <a:srgbClr val="FFFF00"/>
                 </a:solidFill>
@@ -8341,11 +8369,11 @@
               <a:t>pdays</a:t>
             </a:r>
             <a:r>
-              <a:rPr lang="pt-BR" sz="2400" dirty="0" err="1"/>
+              <a:rPr lang="pt-BR" sz="2800" dirty="0" err="1"/>
               <a:t>,</a:t>
             </a:r>
             <a:r>
-              <a:rPr lang="pt-BR" sz="2400" dirty="0" err="1">
+              <a:rPr lang="pt-BR" sz="2800" dirty="0" err="1">
                 <a:solidFill>
                   <a:srgbClr val="FFFF00"/>
                 </a:solidFill>
@@ -8353,29 +8381,29 @@
               <a:t>day</a:t>
             </a:r>
             <a:r>
-              <a:rPr lang="pt-BR" sz="2400" dirty="0" err="1"/>
+              <a:rPr lang="pt-BR" sz="2800" dirty="0" err="1"/>
               <a:t>,</a:t>
             </a:r>
             <a:r>
-              <a:rPr lang="pt-BR" sz="2400" dirty="0" err="1">
+              <a:rPr lang="pt-BR" sz="2800" dirty="0" err="1">
                 <a:solidFill>
                   <a:srgbClr val="FFFF00"/>
                 </a:solidFill>
               </a:rPr>
-              <a:t>moth</a:t>
-            </a:r>
-            <a:r>
-              <a:rPr lang="pt-BR" sz="2400" dirty="0"/>
+              <a:t>month</a:t>
+            </a:r>
+            <a:r>
+              <a:rPr lang="pt-BR" sz="2800" dirty="0"/>
               <a:t>. </a:t>
             </a:r>
           </a:p>
           <a:p>
             <a:r>
-              <a:rPr lang="pt-BR" sz="2400" dirty="0"/>
+              <a:rPr lang="pt-BR" sz="2800" dirty="0"/>
               <a:t>A coluna </a:t>
             </a:r>
             <a:r>
-              <a:rPr lang="pt-BR" sz="2400" dirty="0" err="1">
+              <a:rPr lang="pt-BR" sz="2800" dirty="0" err="1">
                 <a:solidFill>
                   <a:srgbClr val="FFFF00"/>
                 </a:solidFill>
@@ -8383,11 +8411,11 @@
               <a:t>job</a:t>
             </a:r>
             <a:r>
-              <a:rPr lang="pt-BR" sz="2400" dirty="0"/>
+              <a:rPr lang="pt-BR" sz="2800" dirty="0"/>
               <a:t> o motivo é por essa já ter sido tratada com a criação da coluna </a:t>
             </a:r>
             <a:r>
-              <a:rPr lang="pt-BR" sz="2400" dirty="0" err="1">
+              <a:rPr lang="pt-BR" sz="2800" dirty="0" err="1">
                 <a:solidFill>
                   <a:srgbClr val="FFFF00"/>
                 </a:solidFill>
@@ -8395,7 +8423,7 @@
               <a:t>t_e</a:t>
             </a:r>
             <a:r>
-              <a:rPr lang="pt-BR" sz="2400" dirty="0">
+              <a:rPr lang="pt-BR" sz="2800" dirty="0">
                 <a:solidFill>
                   <a:srgbClr val="FFFF00"/>
                 </a:solidFill>
@@ -8403,11 +8431,11 @@
               <a:t>,</a:t>
             </a:r>
             <a:r>
-              <a:rPr lang="pt-BR" sz="2400" dirty="0"/>
+              <a:rPr lang="pt-BR" sz="2800" dirty="0"/>
               <a:t> </a:t>
             </a:r>
             <a:r>
-              <a:rPr lang="pt-BR" sz="2400" dirty="0" err="1">
+              <a:rPr lang="pt-BR" sz="2800" dirty="0" err="1">
                 <a:solidFill>
                   <a:srgbClr val="FFFF00"/>
                 </a:solidFill>
@@ -8415,11 +8443,11 @@
               <a:t>housing</a:t>
             </a:r>
             <a:r>
-              <a:rPr lang="pt-BR" sz="2400" dirty="0"/>
+              <a:rPr lang="pt-BR" sz="2800" dirty="0"/>
               <a:t> e </a:t>
             </a:r>
             <a:r>
-              <a:rPr lang="pt-BR" sz="2400" dirty="0" err="1">
+              <a:rPr lang="pt-BR" sz="2800" dirty="0" err="1">
                 <a:solidFill>
                   <a:srgbClr val="FFFF00"/>
                 </a:solidFill>
@@ -8427,11 +8455,11 @@
               <a:t>loan</a:t>
             </a:r>
             <a:r>
-              <a:rPr lang="pt-BR" sz="2400" dirty="0"/>
+              <a:rPr lang="pt-BR" sz="2800" dirty="0"/>
               <a:t> foram tratadas gerando a coluna </a:t>
             </a:r>
             <a:r>
-              <a:rPr lang="pt-BR" sz="2400" dirty="0" err="1">
+              <a:rPr lang="pt-BR" sz="2800" dirty="0" err="1">
                 <a:solidFill>
                   <a:srgbClr val="FFFF00"/>
                 </a:solidFill>
@@ -8439,11 +8467,11 @@
               <a:t>emprestimo</a:t>
             </a:r>
             <a:r>
-              <a:rPr lang="pt-BR" sz="2400" dirty="0"/>
+              <a:rPr lang="pt-BR" sz="2800" dirty="0"/>
               <a:t>, </a:t>
             </a:r>
             <a:r>
-              <a:rPr lang="pt-BR" sz="2400" dirty="0" err="1">
+              <a:rPr lang="pt-BR" sz="2800" dirty="0" err="1">
                 <a:solidFill>
                   <a:srgbClr val="FFFF00"/>
                 </a:solidFill>
@@ -8451,18 +8479,18 @@
               <a:t>duration</a:t>
             </a:r>
             <a:r>
-              <a:rPr lang="pt-BR" sz="2400" dirty="0"/>
+              <a:rPr lang="pt-BR" sz="2800" dirty="0"/>
               <a:t> por ter sido tratada e criada a coluna </a:t>
             </a:r>
             <a:r>
-              <a:rPr lang="pt-BR" sz="2400" dirty="0" err="1">
+              <a:rPr lang="pt-BR" sz="2800" dirty="0" err="1">
                 <a:solidFill>
                   <a:srgbClr val="FFFF00"/>
                 </a:solidFill>
               </a:rPr>
               <a:t>class_temp_lig</a:t>
             </a:r>
-            <a:endParaRPr lang="pt-BR" sz="2400" dirty="0">
+            <a:endParaRPr lang="pt-BR" sz="2800" dirty="0">
               <a:solidFill>
                 <a:srgbClr val="FFFF00"/>
               </a:solidFill>
@@ -8470,7 +8498,7 @@
           </a:p>
           <a:p>
             <a:r>
-              <a:rPr lang="pt-BR" sz="2400" dirty="0" err="1">
+              <a:rPr lang="pt-BR" sz="2800" dirty="0" err="1">
                 <a:solidFill>
                   <a:srgbClr val="FFFF00"/>
                 </a:solidFill>
@@ -8478,14 +8506,14 @@
               <a:t>poutcome</a:t>
             </a:r>
             <a:r>
-              <a:rPr lang="pt-BR" sz="2400" dirty="0"/>
-              <a:t> foi removida por ter uma quantidade muito grande de registros desconhecidos, mais de 80%,logo sua coluna não terá muita influência. A coluna. As outras por serem irrelevantes ao que focamos como objetivo no </a:t>
-            </a:r>
-            <a:r>
-              <a:rPr lang="pt-BR" sz="2400" dirty="0" err="1"/>
+              <a:rPr lang="pt-BR" sz="2800" dirty="0"/>
+              <a:t> foi removida por ter uma quantidade muito grande de registros desconhecidos, mais de 80%,logo sua coluna não terá muita influência.  As outras por serem irrelevantes ao que focamos como objetivo no </a:t>
+            </a:r>
+            <a:r>
+              <a:rPr lang="pt-BR" sz="2800" dirty="0" err="1"/>
               <a:t>dataset</a:t>
             </a:r>
-            <a:endParaRPr lang="pt-BR" dirty="0"/>
+            <a:endParaRPr lang="pt-BR" sz="2400" dirty="0"/>
           </a:p>
         </p:txBody>
       </p:sp>

</xml_diff>